<commit_message>
Cleaned up SQL file and UML
</commit_message>
<xml_diff>
--- a/DrinkingWaterUML_V2.pptx
+++ b/DrinkingWaterUML_V2.pptx
@@ -3109,11 +3109,26 @@
           </a:p>
           <a:p>
             <a:r>
+              <a:rPr lang="en-US" sz="1200" dirty="0" err="1">
+                <a:latin typeface="Garamond" panose="02020404030301010803" pitchFamily="18" charset="0"/>
+              </a:rPr>
+              <a:t>V</a:t>
+            </a:r>
+            <a:r>
+              <a:rPr lang="en-US" sz="1200" dirty="0" err="1" smtClean="0">
+                <a:latin typeface="Garamond" panose="02020404030301010803" pitchFamily="18" charset="0"/>
+              </a:rPr>
+              <a:t>Date</a:t>
+            </a:r>
+            <a:r>
               <a:rPr lang="en-US" sz="1200" dirty="0" smtClean="0">
                 <a:latin typeface="Garamond" panose="02020404030301010803" pitchFamily="18" charset="0"/>
               </a:rPr>
-              <a:t>Date </a:t>
-            </a:r>
+              <a:t> </a:t>
+            </a:r>
+            <a:endParaRPr lang="en-US" sz="1200" dirty="0" smtClean="0">
+              <a:latin typeface="Garamond" panose="02020404030301010803" pitchFamily="18" charset="0"/>
+            </a:endParaRPr>
           </a:p>
           <a:p>
             <a:r>
@@ -3261,9 +3276,6 @@
               </a:rPr>
               <a:t>Hospitalized</a:t>
             </a:r>
-            <a:endParaRPr lang="en-US" sz="1200" dirty="0" smtClean="0">
-              <a:latin typeface="Garamond" panose="02020404030301010803" pitchFamily="18" charset="0"/>
-            </a:endParaRPr>
           </a:p>
           <a:p>
             <a:r>
@@ -3914,31 +3926,25 @@
               </a:rPr>
               <a:t>PK</a:t>
             </a:r>
+          </a:p>
+          <a:p>
+            <a:r>
+              <a:rPr lang="en-US" sz="1200" dirty="0" err="1" smtClean="0">
+                <a:latin typeface="Garamond" panose="02020404030301010803" pitchFamily="18" charset="0"/>
+              </a:rPr>
+              <a:t>CountyFIPSCode</a:t>
+            </a:r>
             <a:endParaRPr lang="en-US" sz="1200" dirty="0" smtClean="0">
               <a:latin typeface="Garamond" panose="02020404030301010803" pitchFamily="18" charset="0"/>
             </a:endParaRPr>
           </a:p>
           <a:p>
             <a:r>
-              <a:rPr lang="en-US" sz="1200" dirty="0" err="1" smtClean="0">
-                <a:latin typeface="Garamond" panose="02020404030301010803" pitchFamily="18" charset="0"/>
-              </a:rPr>
-              <a:t>CountyFIPSCode</a:t>
-            </a:r>
-            <a:endParaRPr lang="en-US" sz="1200" dirty="0" smtClean="0">
-              <a:latin typeface="Garamond" panose="02020404030301010803" pitchFamily="18" charset="0"/>
-            </a:endParaRPr>
-          </a:p>
-          <a:p>
-            <a:r>
               <a:rPr lang="en-US" sz="1200" dirty="0" smtClean="0">
                 <a:latin typeface="Garamond" panose="02020404030301010803" pitchFamily="18" charset="0"/>
               </a:rPr>
               <a:t>Municipality</a:t>
             </a:r>
-            <a:endParaRPr lang="en-US" sz="1200" dirty="0" smtClean="0">
-              <a:latin typeface="Garamond" panose="02020404030301010803" pitchFamily="18" charset="0"/>
-            </a:endParaRPr>
           </a:p>
         </p:txBody>
       </p:sp>
@@ -4241,26 +4247,22 @@
           </a:p>
           <a:p>
             <a:r>
+              <a:rPr lang="en-US" sz="1200" dirty="0" err="1">
+                <a:latin typeface="Garamond" panose="02020404030301010803" pitchFamily="18" charset="0"/>
+              </a:rPr>
+              <a:t>V</a:t>
+            </a:r>
+            <a:r>
+              <a:rPr lang="en-US" sz="1200" dirty="0" err="1" smtClean="0">
+                <a:latin typeface="Garamond" panose="02020404030301010803" pitchFamily="18" charset="0"/>
+              </a:rPr>
+              <a:t>Date</a:t>
+            </a:r>
+            <a:r>
               <a:rPr lang="en-US" sz="1200" dirty="0" smtClean="0">
                 <a:latin typeface="Garamond" panose="02020404030301010803" pitchFamily="18" charset="0"/>
               </a:rPr>
-              <a:t>Date </a:t>
-            </a:r>
-          </a:p>
-          <a:p>
-            <a:r>
-              <a:rPr lang="en-US" sz="1200" dirty="0" smtClean="0">
-                <a:latin typeface="Garamond" panose="02020404030301010803" pitchFamily="18" charset="0"/>
-              </a:rPr>
-              <a:t>Time</a:t>
-            </a:r>
-          </a:p>
-          <a:p>
-            <a:r>
-              <a:rPr lang="en-US" sz="1200" dirty="0" smtClean="0">
-                <a:latin typeface="Garamond" panose="02020404030301010803" pitchFamily="18" charset="0"/>
-              </a:rPr>
-              <a:t>Latitude</a:t>
+              <a:t> </a:t>
             </a:r>
             <a:endParaRPr lang="en-US" sz="1200" dirty="0" smtClean="0">
               <a:latin typeface="Garamond" panose="02020404030301010803" pitchFamily="18" charset="0"/>
@@ -4271,11 +4273,24 @@
               <a:rPr lang="en-US" sz="1200" dirty="0" smtClean="0">
                 <a:latin typeface="Garamond" panose="02020404030301010803" pitchFamily="18" charset="0"/>
               </a:rPr>
+              <a:t>Time</a:t>
+            </a:r>
+          </a:p>
+          <a:p>
+            <a:r>
+              <a:rPr lang="en-US" sz="1200" dirty="0" smtClean="0">
+                <a:latin typeface="Garamond" panose="02020404030301010803" pitchFamily="18" charset="0"/>
+              </a:rPr>
+              <a:t>Latitude</a:t>
+            </a:r>
+          </a:p>
+          <a:p>
+            <a:r>
+              <a:rPr lang="en-US" sz="1200" dirty="0" smtClean="0">
+                <a:latin typeface="Garamond" panose="02020404030301010803" pitchFamily="18" charset="0"/>
+              </a:rPr>
               <a:t>Longitude</a:t>
             </a:r>
-            <a:endParaRPr lang="en-US" sz="1200" dirty="0" smtClean="0">
-              <a:latin typeface="Garamond" panose="02020404030301010803" pitchFamily="18" charset="0"/>
-            </a:endParaRPr>
           </a:p>
           <a:p>
             <a:r>
@@ -4302,13 +4317,7 @@
               <a:rPr lang="en-US" sz="800" dirty="0" smtClean="0">
                 <a:latin typeface="Garamond" panose="02020404030301010803" pitchFamily="18" charset="0"/>
               </a:rPr>
-              <a:t>//tap </a:t>
-            </a:r>
-            <a:r>
-              <a:rPr lang="en-US" sz="800" dirty="0" smtClean="0">
-                <a:latin typeface="Garamond" panose="02020404030301010803" pitchFamily="18" charset="0"/>
-              </a:rPr>
-              <a:t>or field sample</a:t>
+              <a:t>//tap or field sample</a:t>
             </a:r>
           </a:p>
           <a:p>
@@ -4618,13 +4627,7 @@
               <a:rPr lang="en-US" sz="1200" dirty="0" smtClean="0">
                 <a:latin typeface="Garamond" panose="02020404030301010803" pitchFamily="18" charset="0"/>
               </a:rPr>
-              <a:t>No </a:t>
-            </a:r>
-            <a:r>
-              <a:rPr lang="en-US" sz="1200" dirty="0" smtClean="0">
-                <a:latin typeface="Garamond" panose="02020404030301010803" pitchFamily="18" charset="0"/>
-              </a:rPr>
-              <a:t>Overlap</a:t>
+              <a:t>No Overlap</a:t>
             </a:r>
             <a:endParaRPr lang="en-US" sz="1200" dirty="0">
               <a:latin typeface="Garamond" panose="02020404030301010803" pitchFamily="18" charset="0"/>
@@ -4913,13 +4916,15 @@
               <a:rPr lang="en-US" sz="1200" dirty="0" smtClean="0">
                 <a:latin typeface="Garamond" panose="02020404030301010803" pitchFamily="18" charset="0"/>
               </a:rPr>
-              <a:t>County	</a:t>
-            </a:r>
+              <a:t>County	PK</a:t>
+            </a:r>
+          </a:p>
+          <a:p>
             <a:r>
               <a:rPr lang="en-US" sz="1200" dirty="0" smtClean="0">
                 <a:latin typeface="Garamond" panose="02020404030301010803" pitchFamily="18" charset="0"/>
               </a:rPr>
-              <a:t>PK</a:t>
+              <a:t>State	PK</a:t>
             </a:r>
           </a:p>
           <a:p>
@@ -4927,24 +4932,7 @@
               <a:rPr lang="en-US" sz="1200" dirty="0" smtClean="0">
                 <a:latin typeface="Garamond" panose="02020404030301010803" pitchFamily="18" charset="0"/>
               </a:rPr>
-              <a:t>State	PK</a:t>
-            </a:r>
-            <a:endParaRPr lang="en-US" sz="1200" dirty="0" smtClean="0">
-              <a:latin typeface="Garamond" panose="02020404030301010803" pitchFamily="18" charset="0"/>
-            </a:endParaRPr>
-          </a:p>
-          <a:p>
-            <a:r>
-              <a:rPr lang="en-US" sz="1200" dirty="0" smtClean="0">
-                <a:latin typeface="Garamond" panose="02020404030301010803" pitchFamily="18" charset="0"/>
-              </a:rPr>
-              <a:t>Year	</a:t>
-            </a:r>
-            <a:r>
-              <a:rPr lang="en-US" sz="1200" dirty="0" smtClean="0">
-                <a:latin typeface="Garamond" panose="02020404030301010803" pitchFamily="18" charset="0"/>
-              </a:rPr>
-              <a:t>PK</a:t>
+              <a:t>Year	PK</a:t>
             </a:r>
           </a:p>
         </p:txBody>

</xml_diff>

<commit_message>
Removed Surveyed named association
</commit_message>
<xml_diff>
--- a/DrinkingWaterUML_V2.pptx
+++ b/DrinkingWaterUML_V2.pptx
@@ -2977,8 +2977,8 @@
         </p:nvSpPr>
         <p:spPr>
           <a:xfrm>
-            <a:off x="4648618" y="1673524"/>
-            <a:ext cx="2078966" cy="1328468"/>
+            <a:off x="4649592" y="1774216"/>
+            <a:ext cx="2078966" cy="943386"/>
           </a:xfrm>
           <a:prstGeom prst="flowChartProcess">
             <a:avLst/>
@@ -3024,42 +3024,26 @@
           </a:p>
           <a:p>
             <a:r>
+              <a:rPr lang="en-US" sz="1200" dirty="0" err="1" smtClean="0">
+                <a:latin typeface="Garamond" panose="02020404030301010803" pitchFamily="18" charset="0"/>
+              </a:rPr>
+              <a:t>PopulationServed</a:t>
+            </a:r>
+            <a:r>
               <a:rPr lang="en-US" sz="1200" dirty="0" smtClean="0">
                 <a:latin typeface="Garamond" panose="02020404030301010803" pitchFamily="18" charset="0"/>
               </a:rPr>
-              <a:t>County </a:t>
-            </a:r>
-            <a:endParaRPr lang="en-US" sz="1200" dirty="0">
-              <a:latin typeface="Garamond" panose="02020404030301010803" pitchFamily="18" charset="0"/>
-            </a:endParaRPr>
-          </a:p>
-          <a:p>
-            <a:r>
-              <a:rPr lang="en-US" sz="1200" dirty="0" smtClean="0">
-                <a:latin typeface="Garamond" panose="02020404030301010803" pitchFamily="18" charset="0"/>
-              </a:rPr>
-              <a:t>State </a:t>
-            </a:r>
-          </a:p>
-          <a:p>
-            <a:r>
-              <a:rPr lang="en-US" sz="1200" dirty="0" err="1" smtClean="0">
-                <a:latin typeface="Garamond" panose="02020404030301010803" pitchFamily="18" charset="0"/>
-              </a:rPr>
-              <a:t>PopulationServed</a:t>
-            </a:r>
-            <a:r>
-              <a:rPr lang="en-US" sz="1200" dirty="0" smtClean="0">
-                <a:latin typeface="Garamond" panose="02020404030301010803" pitchFamily="18" charset="0"/>
-              </a:rPr>
               <a:t> </a:t>
             </a:r>
-          </a:p>
-          <a:p>
             <a:endParaRPr lang="en-US" sz="1200" dirty="0" smtClean="0">
               <a:latin typeface="Garamond" panose="02020404030301010803" pitchFamily="18" charset="0"/>
             </a:endParaRPr>
           </a:p>
+          <a:p>
+            <a:endParaRPr lang="en-US" sz="1200" dirty="0" smtClean="0">
+              <a:latin typeface="Garamond" panose="02020404030301010803" pitchFamily="18" charset="0"/>
+            </a:endParaRPr>
+          </a:p>
         </p:txBody>
       </p:sp>
       <p:sp>
@@ -3070,7 +3054,7 @@
         </p:nvSpPr>
         <p:spPr>
           <a:xfrm>
-            <a:off x="6845343" y="5451026"/>
+            <a:off x="6845343" y="5370642"/>
             <a:ext cx="1615978" cy="1261210"/>
           </a:xfrm>
           <a:prstGeom prst="flowChartProcess">
@@ -3169,7 +3153,7 @@
         </p:nvSpPr>
         <p:spPr>
           <a:xfrm>
-            <a:off x="1704441" y="1312729"/>
+            <a:off x="1713292" y="1192815"/>
             <a:ext cx="1615977" cy="2026212"/>
           </a:xfrm>
           <a:prstGeom prst="flowChartProcess">
@@ -3298,7 +3282,7 @@
         </p:nvSpPr>
         <p:spPr>
           <a:xfrm>
-            <a:off x="4891522" y="3478061"/>
+            <a:off x="4891522" y="3397677"/>
             <a:ext cx="1615977" cy="1256374"/>
           </a:xfrm>
           <a:prstGeom prst="flowChartProcess">
@@ -3535,8 +3519,8 @@
         </p:nvSpPr>
         <p:spPr>
           <a:xfrm>
-            <a:off x="7615098" y="1738221"/>
-            <a:ext cx="1481562" cy="1199073"/>
+            <a:off x="7664352" y="1774216"/>
+            <a:ext cx="1481562" cy="970265"/>
           </a:xfrm>
           <a:prstGeom prst="flowChartProcess">
             <a:avLst/>
@@ -3580,15 +3564,13 @@
               <a:rPr lang="en-US" sz="1200" dirty="0" smtClean="0">
                 <a:latin typeface="Garamond" panose="02020404030301010803" pitchFamily="18" charset="0"/>
               </a:rPr>
-              <a:t>PWSID 	PK</a:t>
-            </a:r>
-          </a:p>
-          <a:p>
+              <a:t>Latitude</a:t>
+            </a:r>
             <a:r>
               <a:rPr lang="en-US" sz="1200" dirty="0" smtClean="0">
                 <a:latin typeface="Garamond" panose="02020404030301010803" pitchFamily="18" charset="0"/>
               </a:rPr>
-              <a:t>Latitude	PK</a:t>
+              <a:t>	PK</a:t>
             </a:r>
           </a:p>
           <a:p>
@@ -3606,14 +3588,14 @@
           <p:cNvPr id="12" name="Straight Connector 11"/>
           <p:cNvCxnSpPr>
             <a:stCxn id="10" idx="1"/>
-            <a:endCxn id="4" idx="3"/>
+            <a:endCxn id="18" idx="3"/>
           </p:cNvCxnSpPr>
           <p:nvPr/>
         </p:nvCxnSpPr>
         <p:spPr>
-          <a:xfrm flipH="1">
-            <a:off x="6727584" y="2337758"/>
-            <a:ext cx="887514" cy="0"/>
+          <a:xfrm flipH="1" flipV="1">
+            <a:off x="6945265" y="2257962"/>
+            <a:ext cx="719087" cy="1387"/>
           </a:xfrm>
           <a:prstGeom prst="line">
             <a:avLst/>
@@ -3642,7 +3624,7 @@
         </p:nvSpPr>
         <p:spPr>
           <a:xfrm>
-            <a:off x="6727584" y="2257962"/>
+            <a:off x="6745421" y="2178167"/>
             <a:ext cx="199844" cy="159589"/>
           </a:xfrm>
           <a:prstGeom prst="flowChartDecision">
@@ -3682,7 +3664,7 @@
         </p:nvSpPr>
         <p:spPr>
           <a:xfrm>
-            <a:off x="5673630" y="3267727"/>
+            <a:off x="5673630" y="3187343"/>
             <a:ext cx="477094" cy="261610"/>
           </a:xfrm>
           <a:prstGeom prst="rect">
@@ -3712,7 +3694,7 @@
         </p:nvSpPr>
         <p:spPr>
           <a:xfrm>
-            <a:off x="7176242" y="2086927"/>
+            <a:off x="7209098" y="2298096"/>
             <a:ext cx="477094" cy="261610"/>
           </a:xfrm>
           <a:prstGeom prst="rect">
@@ -3743,7 +3725,7 @@
         </p:nvSpPr>
         <p:spPr>
           <a:xfrm>
-            <a:off x="4447540" y="2251488"/>
+            <a:off x="4454975" y="2120681"/>
             <a:ext cx="199844" cy="159589"/>
           </a:xfrm>
           <a:prstGeom prst="flowChartDecision">
@@ -3783,7 +3765,7 @@
         </p:nvSpPr>
         <p:spPr>
           <a:xfrm>
-            <a:off x="3249581" y="2081476"/>
+            <a:off x="3249581" y="1970948"/>
             <a:ext cx="477094" cy="261610"/>
           </a:xfrm>
           <a:prstGeom prst="rect">
@@ -3818,7 +3800,7 @@
         </p:nvSpPr>
         <p:spPr>
           <a:xfrm>
-            <a:off x="2931485" y="5451026"/>
+            <a:off x="2931485" y="5370642"/>
             <a:ext cx="1615977" cy="712485"/>
           </a:xfrm>
           <a:prstGeom prst="flowChartProcess">
@@ -3956,7 +3938,7 @@
         </p:nvSpPr>
         <p:spPr>
           <a:xfrm>
-            <a:off x="5572845" y="1507588"/>
+            <a:off x="5572845" y="1620134"/>
             <a:ext cx="199844" cy="159589"/>
           </a:xfrm>
           <a:prstGeom prst="flowChartDecision">
@@ -4000,7 +3982,7 @@
         <p:spPr>
           <a:xfrm>
             <a:off x="5672767" y="1066114"/>
-            <a:ext cx="0" cy="441474"/>
+            <a:ext cx="0" cy="554020"/>
           </a:xfrm>
           <a:prstGeom prst="line">
             <a:avLst/>
@@ -4143,7 +4125,7 @@
         </p:nvSpPr>
         <p:spPr>
           <a:xfrm>
-            <a:off x="10081708" y="3008463"/>
+            <a:off x="10081708" y="3058703"/>
             <a:ext cx="477094" cy="261610"/>
           </a:xfrm>
           <a:prstGeom prst="rect">
@@ -4208,7 +4190,7 @@
         </p:nvSpPr>
         <p:spPr>
           <a:xfrm>
-            <a:off x="4798432" y="5194602"/>
+            <a:off x="4798432" y="5114218"/>
             <a:ext cx="1795940" cy="1634215"/>
           </a:xfrm>
           <a:prstGeom prst="flowChartProcess">
@@ -4335,7 +4317,7 @@
         </p:nvSpPr>
         <p:spPr>
           <a:xfrm>
-            <a:off x="5582054" y="4847253"/>
+            <a:off x="5582054" y="4766869"/>
             <a:ext cx="234726" cy="219456"/>
           </a:xfrm>
           <a:prstGeom prst="triangle">
@@ -4384,7 +4366,7 @@
         </p:nvCxnSpPr>
         <p:spPr>
           <a:xfrm flipH="1">
-            <a:off x="5699417" y="4734435"/>
+            <a:off x="5699417" y="4654051"/>
             <a:ext cx="94" cy="112818"/>
           </a:xfrm>
           <a:prstGeom prst="line">
@@ -4421,7 +4403,7 @@
         </p:nvCxnSpPr>
         <p:spPr>
           <a:xfrm flipH="1">
-            <a:off x="5816780" y="5066709"/>
+            <a:off x="5816780" y="4986325"/>
             <a:ext cx="1836556" cy="0"/>
           </a:xfrm>
           <a:prstGeom prst="line">
@@ -4458,7 +4440,7 @@
         </p:nvCxnSpPr>
         <p:spPr>
           <a:xfrm>
-            <a:off x="3739473" y="5066709"/>
+            <a:off x="3739473" y="4986325"/>
             <a:ext cx="1842581" cy="0"/>
           </a:xfrm>
           <a:prstGeom prst="line">
@@ -4496,7 +4478,7 @@
         </p:nvCxnSpPr>
         <p:spPr>
           <a:xfrm flipV="1">
-            <a:off x="5696402" y="5066709"/>
+            <a:off x="5696402" y="4986325"/>
             <a:ext cx="3015" cy="127893"/>
           </a:xfrm>
           <a:prstGeom prst="line">
@@ -4531,7 +4513,7 @@
         </p:nvCxnSpPr>
         <p:spPr>
           <a:xfrm flipH="1" flipV="1">
-            <a:off x="3739473" y="5066709"/>
+            <a:off x="3739473" y="4986325"/>
             <a:ext cx="4" cy="384318"/>
           </a:xfrm>
           <a:prstGeom prst="line">
@@ -4566,7 +4548,7 @@
         </p:nvCxnSpPr>
         <p:spPr>
           <a:xfrm flipH="1" flipV="1">
-            <a:off x="7653332" y="5066709"/>
+            <a:off x="7653332" y="4986325"/>
             <a:ext cx="4" cy="384318"/>
           </a:xfrm>
           <a:prstGeom prst="line">
@@ -4601,7 +4583,7 @@
         </p:nvSpPr>
         <p:spPr>
           <a:xfrm>
-            <a:off x="6480024" y="4631436"/>
+            <a:off x="6480024" y="4551052"/>
             <a:ext cx="1537741" cy="461665"/>
           </a:xfrm>
           <a:prstGeom prst="rect">
@@ -4643,7 +4625,7 @@
         </p:nvSpPr>
         <p:spPr>
           <a:xfrm>
-            <a:off x="5589503" y="3019487"/>
+            <a:off x="5586488" y="2727657"/>
             <a:ext cx="219828" cy="159589"/>
           </a:xfrm>
           <a:prstGeom prst="flowChartDecision">
@@ -4683,7 +4665,7 @@
         </p:nvSpPr>
         <p:spPr>
           <a:xfrm>
-            <a:off x="5350869" y="3202344"/>
+            <a:off x="5350869" y="3121960"/>
             <a:ext cx="348739" cy="276999"/>
           </a:xfrm>
           <a:prstGeom prst="rect">
@@ -4721,8 +4703,8 @@
         </p:nvCxnSpPr>
         <p:spPr>
           <a:xfrm>
-            <a:off x="5699417" y="3179076"/>
-            <a:ext cx="94" cy="298985"/>
+            <a:off x="5696402" y="2887246"/>
+            <a:ext cx="3109" cy="510431"/>
           </a:xfrm>
           <a:prstGeom prst="line">
             <a:avLst/>
@@ -4796,7 +4778,7 @@
         </p:nvSpPr>
         <p:spPr>
           <a:xfrm>
-            <a:off x="7271254" y="2339911"/>
+            <a:off x="7315065" y="1985856"/>
             <a:ext cx="348739" cy="276999"/>
           </a:xfrm>
           <a:prstGeom prst="rect">
@@ -4831,7 +4813,7 @@
         </p:nvSpPr>
         <p:spPr>
           <a:xfrm>
-            <a:off x="5323152" y="1070315"/>
+            <a:off x="5333200" y="1060267"/>
             <a:ext cx="348739" cy="276999"/>
           </a:xfrm>
           <a:prstGeom prst="rect">
@@ -4858,131 +4840,19 @@
           </a:p>
         </p:txBody>
       </p:sp>
-      <p:sp>
-        <p:nvSpPr>
-          <p:cNvPr id="42" name="Flowchart: Process 9"/>
-          <p:cNvSpPr/>
-          <p:nvPr/>
-        </p:nvSpPr>
-        <p:spPr>
-          <a:xfrm>
-            <a:off x="10474696" y="686446"/>
-            <a:ext cx="1481562" cy="1202827"/>
-          </a:xfrm>
-          <a:prstGeom prst="flowChartProcess">
-            <a:avLst/>
-          </a:prstGeom>
-        </p:spPr>
-        <p:style>
-          <a:lnRef idx="2">
-            <a:schemeClr val="dk1"/>
-          </a:lnRef>
-          <a:fillRef idx="1">
-            <a:schemeClr val="lt1"/>
-          </a:fillRef>
-          <a:effectRef idx="0">
-            <a:schemeClr val="dk1"/>
-          </a:effectRef>
-          <a:fontRef idx="minor">
-            <a:schemeClr val="dk1"/>
-          </a:fontRef>
-        </p:style>
-        <p:txBody>
-          <a:bodyPr rtlCol="0" anchor="t"/>
-          <a:lstStyle/>
-          <a:p>
-            <a:r>
-              <a:rPr lang="en-US" sz="1200" b="1" dirty="0" smtClean="0">
-                <a:latin typeface="Garamond" panose="02020404030301010803" pitchFamily="18" charset="0"/>
-              </a:rPr>
-              <a:t>Surveyed</a:t>
-            </a:r>
-          </a:p>
-          <a:p>
-            <a:endParaRPr lang="en-US" sz="1200" dirty="0">
-              <a:latin typeface="Garamond" panose="02020404030301010803" pitchFamily="18" charset="0"/>
-            </a:endParaRPr>
-          </a:p>
-          <a:p>
-            <a:r>
-              <a:rPr lang="en-US" sz="1200" dirty="0" smtClean="0">
-                <a:latin typeface="Garamond" panose="02020404030301010803" pitchFamily="18" charset="0"/>
-              </a:rPr>
-              <a:t>PWSID 	PK</a:t>
-            </a:r>
-          </a:p>
-          <a:p>
-            <a:r>
-              <a:rPr lang="en-US" sz="1200" dirty="0" smtClean="0">
-                <a:latin typeface="Garamond" panose="02020404030301010803" pitchFamily="18" charset="0"/>
-              </a:rPr>
-              <a:t>County	PK</a:t>
-            </a:r>
-          </a:p>
-          <a:p>
-            <a:r>
-              <a:rPr lang="en-US" sz="1200" dirty="0" smtClean="0">
-                <a:latin typeface="Garamond" panose="02020404030301010803" pitchFamily="18" charset="0"/>
-              </a:rPr>
-              <a:t>State	PK</a:t>
-            </a:r>
-          </a:p>
-          <a:p>
-            <a:r>
-              <a:rPr lang="en-US" sz="1200" dirty="0" smtClean="0">
-                <a:latin typeface="Garamond" panose="02020404030301010803" pitchFamily="18" charset="0"/>
-              </a:rPr>
-              <a:t>Year	PK</a:t>
-            </a:r>
-          </a:p>
-        </p:txBody>
-      </p:sp>
-      <p:sp>
-        <p:nvSpPr>
-          <p:cNvPr id="25" name="TextBox 24"/>
-          <p:cNvSpPr txBox="1"/>
-          <p:nvPr/>
-        </p:nvSpPr>
-        <p:spPr>
-          <a:xfrm>
-            <a:off x="10448596" y="1950982"/>
-            <a:ext cx="1507662" cy="584775"/>
-          </a:xfrm>
-          <a:prstGeom prst="rect">
-            <a:avLst/>
-          </a:prstGeom>
-          <a:noFill/>
-        </p:spPr>
-        <p:txBody>
-          <a:bodyPr wrap="square" rtlCol="0">
-            <a:spAutoFit/>
-          </a:bodyPr>
-          <a:lstStyle/>
-          <a:p>
-            <a:r>
-              <a:rPr lang="en-US" sz="800" dirty="0" smtClean="0">
-                <a:latin typeface="Garamond" panose="02020404030301010803" pitchFamily="18" charset="0"/>
-              </a:rPr>
-              <a:t>The association of Census report and and Primary County Served with be based on the PKs from two tables.</a:t>
-            </a:r>
-            <a:endParaRPr lang="en-US" sz="800" dirty="0">
-              <a:latin typeface="Garamond" panose="02020404030301010803" pitchFamily="18" charset="0"/>
-            </a:endParaRPr>
-          </a:p>
-        </p:txBody>
-      </p:sp>
       <p:cxnSp>
         <p:nvCxnSpPr>
-          <p:cNvPr id="28" name="Straight Connector 27"/>
+          <p:cNvPr id="55" name="Straight Connector 54"/>
           <p:cNvCxnSpPr>
-            <a:stCxn id="42" idx="1"/>
+            <a:stCxn id="40" idx="1"/>
+            <a:endCxn id="7" idx="3"/>
           </p:cNvCxnSpPr>
           <p:nvPr/>
         </p:nvCxnSpPr>
         <p:spPr>
           <a:xfrm flipH="1">
-            <a:off x="10081708" y="1287860"/>
-            <a:ext cx="392988" cy="0"/>
+            <a:off x="3329269" y="2200476"/>
+            <a:ext cx="1125706" cy="5445"/>
           </a:xfrm>
           <a:prstGeom prst="line">
             <a:avLst/>
@@ -5003,39 +4873,41 @@
           </a:fontRef>
         </p:style>
       </p:cxnSp>
-      <p:cxnSp>
-        <p:nvCxnSpPr>
-          <p:cNvPr id="55" name="Straight Connector 54"/>
-          <p:cNvCxnSpPr>
-            <a:stCxn id="40" idx="1"/>
-            <a:endCxn id="7" idx="3"/>
-          </p:cNvCxnSpPr>
+      <p:sp>
+        <p:nvSpPr>
+          <p:cNvPr id="45" name="TextBox 44"/>
+          <p:cNvSpPr txBox="1"/>
           <p:nvPr/>
-        </p:nvCxnSpPr>
-        <p:spPr>
-          <a:xfrm flipH="1" flipV="1">
-            <a:off x="3320418" y="2325835"/>
-            <a:ext cx="1127122" cy="5448"/>
-          </a:xfrm>
-          <a:prstGeom prst="line">
+        </p:nvSpPr>
+        <p:spPr>
+          <a:xfrm>
+            <a:off x="9729902" y="3036329"/>
+            <a:ext cx="348739" cy="276999"/>
+          </a:xfrm>
+          <a:prstGeom prst="rect">
             <a:avLst/>
           </a:prstGeom>
-        </p:spPr>
-        <p:style>
-          <a:lnRef idx="1">
-            <a:schemeClr val="dk1"/>
-          </a:lnRef>
-          <a:fillRef idx="0">
-            <a:schemeClr val="dk1"/>
-          </a:fillRef>
-          <a:effectRef idx="0">
-            <a:schemeClr val="dk1"/>
-          </a:effectRef>
-          <a:fontRef idx="minor">
-            <a:schemeClr val="tx1"/>
-          </a:fontRef>
-        </p:style>
-      </p:cxnSp>
+          <a:noFill/>
+          <a:ln>
+            <a:solidFill>
+              <a:schemeClr val="tx1"/>
+            </a:solidFill>
+          </a:ln>
+        </p:spPr>
+        <p:txBody>
+          <a:bodyPr wrap="square" rtlCol="0">
+            <a:spAutoFit/>
+          </a:bodyPr>
+          <a:lstStyle/>
+          <a:p>
+            <a:r>
+              <a:rPr lang="en-US" sz="1200" dirty="0" smtClean="0"/>
+              <a:t>PK</a:t>
+            </a:r>
+            <a:endParaRPr lang="en-US" sz="1200" dirty="0"/>
+          </a:p>
+        </p:txBody>
+      </p:sp>
     </p:spTree>
     <p:extLst>
       <p:ext uri="{BB962C8B-B14F-4D97-AF65-F5344CB8AC3E}">

</xml_diff>